<commit_message>
updated presentation (red text)
</commit_message>
<xml_diff>
--- a/doc/Presentations/QuantumERPClassification.pptx
+++ b/doc/Presentations/QuantumERPClassification.pptx
@@ -346,7 +346,7 @@
           <a:p>
             <a:fld id="{405DFE8A-D39A-4202-910E-D29A2D27780F}" type="datetimeFigureOut">
               <a:rPr lang="fr-FR" smtClean="0"/>
-              <a:t>06/07/2022</a:t>
+              <a:t>07/07/2022</a:t>
             </a:fld>
             <a:endParaRPr lang="fr-FR"/>
           </a:p>
@@ -1660,7 +1660,14 @@
               <a:defRPr/>
             </a:pPr>
             <a:r>
-              <a:rPr lang="en-US" dirty="0"/>
+              <a:rPr lang="en-US" sz="1200" kern="1200" dirty="0">
+                <a:solidFill>
+                  <a:schemeClr val="tx1"/>
+                </a:solidFill>
+                <a:latin typeface="+mn-lt"/>
+                <a:ea typeface="+mn-ea"/>
+                <a:cs typeface="+mn-cs"/>
+              </a:rPr>
               <a:t>Training is slow because many users are “fighting” for the same “quantum computer”. Building the Quantum Feature Map is done by performing many “Quantum jobs” (a unit of work executed on a Quantum computer).</a:t>
             </a:r>
           </a:p>
@@ -1683,7 +1690,14 @@
               <a:defRPr/>
             </a:pPr>
             <a:r>
-              <a:rPr lang="en-US" dirty="0"/>
+              <a:rPr lang="en-US" sz="1200" kern="1200" dirty="0">
+                <a:solidFill>
+                  <a:schemeClr val="tx1"/>
+                </a:solidFill>
+                <a:latin typeface="+mn-lt"/>
+                <a:ea typeface="+mn-ea"/>
+                <a:cs typeface="+mn-cs"/>
+              </a:rPr>
               <a:t>“Shots” – the number of times the circuit is executed. More shots gives more confidence in the result, but it also takes much longer to process.</a:t>
             </a:r>
           </a:p>
@@ -1706,7 +1720,14 @@
               <a:defRPr/>
             </a:pPr>
             <a:r>
-              <a:rPr lang="en-US" dirty="0"/>
+              <a:rPr lang="en-US" sz="1200" kern="1200" dirty="0">
+                <a:solidFill>
+                  <a:schemeClr val="tx1"/>
+                </a:solidFill>
+                <a:latin typeface="+mn-lt"/>
+                <a:ea typeface="+mn-ea"/>
+                <a:cs typeface="+mn-cs"/>
+              </a:rPr>
               <a:t>The size of the generated feature vector (based on RG + Tangent Space) is limited to the number of available quantum bits.</a:t>
             </a:r>
           </a:p>
@@ -1729,10 +1750,24 @@
               <a:defRPr/>
             </a:pPr>
             <a:r>
-              <a:rPr lang="en-US" dirty="0"/>
+              <a:rPr lang="en-US" sz="1200" kern="1200" dirty="0">
+                <a:solidFill>
+                  <a:schemeClr val="tx1"/>
+                </a:solidFill>
+                <a:latin typeface="+mn-lt"/>
+                <a:ea typeface="+mn-ea"/>
+                <a:cs typeface="+mn-cs"/>
+              </a:rPr>
               <a:t>A real quantum computer should perform less accurately than an emulated one. Although an emulated quantum computer can include emulation of quantum noise.</a:t>
             </a:r>
-            <a:endParaRPr lang="fr-FR" dirty="0"/>
+            <a:endParaRPr lang="fr-FR" sz="1200" kern="1200" dirty="0">
+              <a:solidFill>
+                <a:schemeClr val="tx1"/>
+              </a:solidFill>
+              <a:latin typeface="+mn-lt"/>
+              <a:ea typeface="+mn-ea"/>
+              <a:cs typeface="+mn-cs"/>
+            </a:endParaRPr>
           </a:p>
           <a:p>
             <a:pPr marL="0" marR="0" lvl="0" indent="0" algn="l" defTabSz="914400" rtl="0" eaLnBrk="1" fontAlgn="auto" latinLnBrk="0" hangingPunct="1">
@@ -1753,17 +1788,23 @@
               <a:defRPr/>
             </a:pPr>
             <a:r>
-              <a:rPr lang="en-US" dirty="0">
+              <a:rPr lang="en-US" sz="1200" kern="1200" dirty="0">
                 <a:solidFill>
-                  <a:srgbClr val="FF0000"/>
+                  <a:schemeClr val="tx1"/>
                 </a:solidFill>
+                <a:latin typeface="+mn-lt"/>
+                <a:ea typeface="+mn-ea"/>
+                <a:cs typeface="+mn-cs"/>
               </a:rPr>
               <a:t>Adding more data (P300 ERP epochs) means more quantum jobs and more time to complete. But limiting the input data however means less training of the QSVM.</a:t>
             </a:r>
-            <a:endParaRPr lang="fr-FR" dirty="0">
+            <a:endParaRPr lang="fr-FR" sz="1200" kern="1200" dirty="0">
               <a:solidFill>
-                <a:srgbClr val="FF0000"/>
+                <a:schemeClr val="tx1"/>
               </a:solidFill>
+              <a:latin typeface="+mn-lt"/>
+              <a:ea typeface="+mn-ea"/>
+              <a:cs typeface="+mn-cs"/>
             </a:endParaRPr>
           </a:p>
           <a:p>
@@ -3750,7 +3791,7 @@
           <a:p>
             <a:fld id="{6F050863-F977-4D2E-8584-CBB06482BB55}" type="datetime1">
               <a:rPr lang="fr-FR" smtClean="0"/>
-              <a:t>06/07/2022</a:t>
+              <a:t>07/07/2022</a:t>
             </a:fld>
             <a:endParaRPr lang="fr-FR"/>
           </a:p>
@@ -3952,7 +3993,7 @@
           <a:p>
             <a:fld id="{D267D086-F7AA-4938-8E6E-61E4D8B4CC6B}" type="datetime1">
               <a:rPr lang="fr-FR" smtClean="0"/>
-              <a:t>06/07/2022</a:t>
+              <a:t>07/07/2022</a:t>
             </a:fld>
             <a:endParaRPr lang="fr-FR"/>
           </a:p>
@@ -4164,7 +4205,7 @@
           <a:p>
             <a:fld id="{E76C9A97-58E4-4DE6-AB62-85196C7B2402}" type="datetime1">
               <a:rPr lang="fr-FR" smtClean="0"/>
-              <a:t>06/07/2022</a:t>
+              <a:t>07/07/2022</a:t>
             </a:fld>
             <a:endParaRPr lang="fr-FR"/>
           </a:p>
@@ -4366,7 +4407,7 @@
           <a:p>
             <a:fld id="{176B3391-8225-4F74-AD10-E7C085897636}" type="datetime1">
               <a:rPr lang="fr-FR" smtClean="0"/>
-              <a:t>06/07/2022</a:t>
+              <a:t>07/07/2022</a:t>
             </a:fld>
             <a:endParaRPr lang="fr-FR"/>
           </a:p>
@@ -4645,7 +4686,7 @@
           <a:p>
             <a:fld id="{8614A783-A98D-4BD0-9AD7-B9BFC3483BEF}" type="datetime1">
               <a:rPr lang="fr-FR" smtClean="0"/>
-              <a:t>06/07/2022</a:t>
+              <a:t>07/07/2022</a:t>
             </a:fld>
             <a:endParaRPr lang="fr-FR"/>
           </a:p>
@@ -4914,7 +4955,7 @@
           <a:p>
             <a:fld id="{1E9342B3-B80D-4FC5-99C5-17061F9933A6}" type="datetime1">
               <a:rPr lang="fr-FR" smtClean="0"/>
-              <a:t>06/07/2022</a:t>
+              <a:t>07/07/2022</a:t>
             </a:fld>
             <a:endParaRPr lang="fr-FR"/>
           </a:p>
@@ -5330,7 +5371,7 @@
           <a:p>
             <a:fld id="{913ED63A-ED90-4259-8321-FDF074E85182}" type="datetime1">
               <a:rPr lang="fr-FR" smtClean="0"/>
-              <a:t>06/07/2022</a:t>
+              <a:t>07/07/2022</a:t>
             </a:fld>
             <a:endParaRPr lang="fr-FR"/>
           </a:p>
@@ -5475,7 +5516,7 @@
           <a:p>
             <a:fld id="{0FF7710B-8351-4F0B-B139-C05A904AAD11}" type="datetime1">
               <a:rPr lang="fr-FR" smtClean="0"/>
-              <a:t>06/07/2022</a:t>
+              <a:t>07/07/2022</a:t>
             </a:fld>
             <a:endParaRPr lang="fr-FR"/>
           </a:p>
@@ -5592,7 +5633,7 @@
           <a:p>
             <a:fld id="{45B8A9EE-E7B4-4726-81DF-C64282D985E3}" type="datetime1">
               <a:rPr lang="fr-FR" smtClean="0"/>
-              <a:t>06/07/2022</a:t>
+              <a:t>07/07/2022</a:t>
             </a:fld>
             <a:endParaRPr lang="fr-FR"/>
           </a:p>
@@ -5907,7 +5948,7 @@
           <a:p>
             <a:fld id="{FCA8F5FA-45E0-4284-A669-2AE02C391916}" type="datetime1">
               <a:rPr lang="fr-FR" smtClean="0"/>
-              <a:t>06/07/2022</a:t>
+              <a:t>07/07/2022</a:t>
             </a:fld>
             <a:endParaRPr lang="fr-FR"/>
           </a:p>
@@ -6199,7 +6240,7 @@
           <a:p>
             <a:fld id="{1E396CFA-2049-4D62-95FB-6550012CE87E}" type="datetime1">
               <a:rPr lang="fr-FR" smtClean="0"/>
-              <a:t>06/07/2022</a:t>
+              <a:t>07/07/2022</a:t>
             </a:fld>
             <a:endParaRPr lang="fr-FR"/>
           </a:p>
@@ -6444,7 +6485,7 @@
           <a:p>
             <a:fld id="{3D54491E-440C-4D0A-83E4-2136C4F6BE0B}" type="datetime1">
               <a:rPr lang="fr-FR" smtClean="0"/>
-              <a:t>06/07/2022</a:t>
+              <a:t>07/07/2022</a:t>
             </a:fld>
             <a:endParaRPr lang="fr-FR"/>
           </a:p>
@@ -7291,7 +7332,7 @@
   </p:clrMapOvr>
   <p:extLst mod="1">
     <p:ext uri="{6950BFC3-D8DA-4A85-94F7-54DA5524770B}">
-      <p188:commentRel xmlns="" xmlns:p188="http://schemas.microsoft.com/office/powerpoint/2018/8/main" r:id="rId5"/>
+      <p188:commentRel xmlns:p188="http://schemas.microsoft.com/office/powerpoint/2018/8/main" xmlns="" r:id="rId5"/>
     </p:ext>
   </p:extLst>
 </p:sld>
@@ -7556,7 +7597,7 @@
   </p:clrMapOvr>
   <p:extLst mod="1">
     <p:ext uri="{6950BFC3-D8DA-4A85-94F7-54DA5524770B}">
-      <p188:commentRel xmlns="" xmlns:p188="http://schemas.microsoft.com/office/powerpoint/2018/8/main" r:id="rId4"/>
+      <p188:commentRel xmlns:p188="http://schemas.microsoft.com/office/powerpoint/2018/8/main" xmlns="" r:id="rId4"/>
     </p:ext>
   </p:extLst>
 </p:sld>
@@ -8242,7 +8283,7 @@
   </p:clrMapOvr>
   <p:extLst mod="1">
     <p:ext uri="{6950BFC3-D8DA-4A85-94F7-54DA5524770B}">
-      <p188:commentRel xmlns="" xmlns:p188="http://schemas.microsoft.com/office/powerpoint/2018/8/main" r:id="rId4"/>
+      <p188:commentRel xmlns:p188="http://schemas.microsoft.com/office/powerpoint/2018/8/main" xmlns="" r:id="rId4"/>
     </p:ext>
   </p:extLst>
 </p:sld>
@@ -8733,7 +8774,7 @@
   </p:clrMapOvr>
   <p:extLst mod="1">
     <p:ext uri="{6950BFC3-D8DA-4A85-94F7-54DA5524770B}">
-      <p188:commentRel xmlns="" xmlns:p188="http://schemas.microsoft.com/office/powerpoint/2018/8/main" r:id="rId4"/>
+      <p188:commentRel xmlns:p188="http://schemas.microsoft.com/office/powerpoint/2018/8/main" xmlns="" r:id="rId4"/>
     </p:ext>
   </p:extLst>
 </p:sld>
@@ -11901,7 +11942,7 @@
   </p:clrMapOvr>
   <p:extLst mod="1">
     <p:ext uri="{6950BFC3-D8DA-4A85-94F7-54DA5524770B}">
-      <p188:commentRel xmlns="" xmlns:p188="http://schemas.microsoft.com/office/powerpoint/2018/8/main" r:id="rId4"/>
+      <p188:commentRel xmlns:p188="http://schemas.microsoft.com/office/powerpoint/2018/8/main" xmlns="" r:id="rId4"/>
     </p:ext>
   </p:extLst>
 </p:sld>

</xml_diff>